<commit_message>
ajout d'images à la présentation
</commit_message>
<xml_diff>
--- a/Projet de licence Salt - LPEPD.pptx
+++ b/Projet de licence Salt - LPEPD.pptx
@@ -808,7 +808,7 @@
   <p:cSld>
     <p:spTree>
       <p:nvGrpSpPr>
-        <p:cNvPr id="136" name="Shape 136"/>
+        <p:cNvPr id="137" name="Shape 137"/>
         <p:cNvGrpSpPr/>
         <p:nvPr/>
       </p:nvGrpSpPr>
@@ -822,7 +822,7 @@
       </p:grpSpPr>
       <p:sp>
         <p:nvSpPr>
-          <p:cNvPr id="137" name="Shape 137"/>
+          <p:cNvPr id="138" name="Shape 138"/>
           <p:cNvSpPr/>
           <p:nvPr>
             <p:ph idx="2" type="sldImg"/>
@@ -856,7 +856,7 @@
       </p:sp>
       <p:sp>
         <p:nvSpPr>
-          <p:cNvPr id="138" name="Shape 138"/>
+          <p:cNvPr id="139" name="Shape 139"/>
           <p:cNvSpPr txBox="1"/>
           <p:nvPr>
             <p:ph idx="1" type="body"/>
@@ -906,7 +906,7 @@
   <p:cSld>
     <p:spTree>
       <p:nvGrpSpPr>
-        <p:cNvPr id="142" name="Shape 142"/>
+        <p:cNvPr id="145" name="Shape 145"/>
         <p:cNvGrpSpPr/>
         <p:nvPr/>
       </p:nvGrpSpPr>
@@ -920,7 +920,7 @@
       </p:grpSpPr>
       <p:sp>
         <p:nvSpPr>
-          <p:cNvPr id="143" name="Shape 143"/>
+          <p:cNvPr id="146" name="Shape 146"/>
           <p:cNvSpPr/>
           <p:nvPr>
             <p:ph idx="2" type="sldImg"/>
@@ -954,7 +954,7 @@
       </p:sp>
       <p:sp>
         <p:nvSpPr>
-          <p:cNvPr id="144" name="Shape 144"/>
+          <p:cNvPr id="147" name="Shape 147"/>
           <p:cNvSpPr txBox="1"/>
           <p:nvPr>
             <p:ph idx="1" type="body"/>
@@ -1004,7 +1004,7 @@
   <p:cSld>
     <p:spTree>
       <p:nvGrpSpPr>
-        <p:cNvPr id="148" name="Shape 148"/>
+        <p:cNvPr id="151" name="Shape 151"/>
         <p:cNvGrpSpPr/>
         <p:nvPr/>
       </p:nvGrpSpPr>
@@ -1018,7 +1018,7 @@
       </p:grpSpPr>
       <p:sp>
         <p:nvSpPr>
-          <p:cNvPr id="149" name="Shape 149"/>
+          <p:cNvPr id="152" name="Shape 152"/>
           <p:cNvSpPr/>
           <p:nvPr>
             <p:ph idx="2" type="sldImg"/>
@@ -1052,7 +1052,7 @@
       </p:sp>
       <p:sp>
         <p:nvSpPr>
-          <p:cNvPr id="150" name="Shape 150"/>
+          <p:cNvPr id="153" name="Shape 153"/>
           <p:cNvSpPr txBox="1"/>
           <p:nvPr>
             <p:ph idx="1" type="body"/>
@@ -1102,7 +1102,7 @@
   <p:cSld>
     <p:spTree>
       <p:nvGrpSpPr>
-        <p:cNvPr id="154" name="Shape 154"/>
+        <p:cNvPr id="157" name="Shape 157"/>
         <p:cNvGrpSpPr/>
         <p:nvPr/>
       </p:nvGrpSpPr>
@@ -1116,7 +1116,7 @@
       </p:grpSpPr>
       <p:sp>
         <p:nvSpPr>
-          <p:cNvPr id="155" name="Shape 155"/>
+          <p:cNvPr id="158" name="Shape 158"/>
           <p:cNvSpPr/>
           <p:nvPr>
             <p:ph idx="2" type="sldImg"/>
@@ -1150,7 +1150,7 @@
       </p:sp>
       <p:sp>
         <p:nvSpPr>
-          <p:cNvPr id="156" name="Shape 156"/>
+          <p:cNvPr id="159" name="Shape 159"/>
           <p:cNvSpPr txBox="1"/>
           <p:nvPr>
             <p:ph idx="1" type="body"/>
@@ -1200,7 +1200,7 @@
   <p:cSld>
     <p:spTree>
       <p:nvGrpSpPr>
-        <p:cNvPr id="160" name="Shape 160"/>
+        <p:cNvPr id="165" name="Shape 165"/>
         <p:cNvGrpSpPr/>
         <p:nvPr/>
       </p:nvGrpSpPr>
@@ -1214,7 +1214,7 @@
       </p:grpSpPr>
       <p:sp>
         <p:nvSpPr>
-          <p:cNvPr id="161" name="Shape 161"/>
+          <p:cNvPr id="166" name="Shape 166"/>
           <p:cNvSpPr/>
           <p:nvPr>
             <p:ph idx="2" type="sldImg"/>
@@ -1248,7 +1248,7 @@
       </p:sp>
       <p:sp>
         <p:nvSpPr>
-          <p:cNvPr id="162" name="Shape 162"/>
+          <p:cNvPr id="167" name="Shape 167"/>
           <p:cNvSpPr txBox="1"/>
           <p:nvPr>
             <p:ph idx="1" type="body"/>
@@ -1298,7 +1298,7 @@
   <p:cSld>
     <p:spTree>
       <p:nvGrpSpPr>
-        <p:cNvPr id="166" name="Shape 166"/>
+        <p:cNvPr id="171" name="Shape 171"/>
         <p:cNvGrpSpPr/>
         <p:nvPr/>
       </p:nvGrpSpPr>
@@ -1312,7 +1312,7 @@
       </p:grpSpPr>
       <p:sp>
         <p:nvSpPr>
-          <p:cNvPr id="167" name="Shape 167"/>
+          <p:cNvPr id="172" name="Shape 172"/>
           <p:cNvSpPr/>
           <p:nvPr>
             <p:ph idx="2" type="sldImg"/>
@@ -1346,7 +1346,7 @@
       </p:sp>
       <p:sp>
         <p:nvSpPr>
-          <p:cNvPr id="168" name="Shape 168"/>
+          <p:cNvPr id="173" name="Shape 173"/>
           <p:cNvSpPr txBox="1"/>
           <p:nvPr>
             <p:ph idx="1" type="body"/>
@@ -9711,6 +9711,34 @@
           </a:p>
         </p:txBody>
       </p:sp>
+      <p:pic>
+        <p:nvPicPr>
+          <p:cNvPr id="136" name="Shape 136"/>
+          <p:cNvPicPr preferRelativeResize="0"/>
+          <p:nvPr/>
+        </p:nvPicPr>
+        <p:blipFill>
+          <a:blip r:embed="rId3">
+            <a:alphaModFix/>
+          </a:blip>
+          <a:stretch>
+            <a:fillRect/>
+          </a:stretch>
+        </p:blipFill>
+        <p:spPr>
+          <a:xfrm>
+            <a:off x="7260323" y="2496550"/>
+            <a:ext cx="1294325" cy="2301051"/>
+          </a:xfrm>
+          <a:prstGeom prst="rect">
+            <a:avLst/>
+          </a:prstGeom>
+          <a:noFill/>
+          <a:ln>
+            <a:noFill/>
+          </a:ln>
+        </p:spPr>
+      </p:pic>
     </p:spTree>
   </p:cSld>
   <p:clrMapOvr>
@@ -9724,7 +9752,7 @@
   <p:cSld>
     <p:spTree>
       <p:nvGrpSpPr>
-        <p:cNvPr id="139" name="Shape 139"/>
+        <p:cNvPr id="140" name="Shape 140"/>
         <p:cNvGrpSpPr/>
         <p:nvPr/>
       </p:nvGrpSpPr>
@@ -9738,7 +9766,7 @@
       </p:grpSpPr>
       <p:sp>
         <p:nvSpPr>
-          <p:cNvPr id="140" name="Shape 140"/>
+          <p:cNvPr id="141" name="Shape 141"/>
           <p:cNvSpPr txBox="1"/>
           <p:nvPr>
             <p:ph type="title"/>
@@ -9778,7 +9806,7 @@
       </p:sp>
       <p:sp>
         <p:nvSpPr>
-          <p:cNvPr id="141" name="Shape 141"/>
+          <p:cNvPr id="142" name="Shape 142"/>
           <p:cNvSpPr txBox="1"/>
           <p:nvPr>
             <p:ph idx="1" type="body"/>
@@ -9917,6 +9945,62 @@
           </a:p>
         </p:txBody>
       </p:sp>
+      <p:pic>
+        <p:nvPicPr>
+          <p:cNvPr id="143" name="Shape 143"/>
+          <p:cNvPicPr preferRelativeResize="0"/>
+          <p:nvPr/>
+        </p:nvPicPr>
+        <p:blipFill>
+          <a:blip r:embed="rId3">
+            <a:alphaModFix/>
+          </a:blip>
+          <a:stretch>
+            <a:fillRect/>
+          </a:stretch>
+        </p:blipFill>
+        <p:spPr>
+          <a:xfrm>
+            <a:off x="4017750" y="2534175"/>
+            <a:ext cx="1529600" cy="2466451"/>
+          </a:xfrm>
+          <a:prstGeom prst="rect">
+            <a:avLst/>
+          </a:prstGeom>
+          <a:noFill/>
+          <a:ln>
+            <a:noFill/>
+          </a:ln>
+        </p:spPr>
+      </p:pic>
+      <p:pic>
+        <p:nvPicPr>
+          <p:cNvPr id="144" name="Shape 144"/>
+          <p:cNvPicPr preferRelativeResize="0"/>
+          <p:nvPr/>
+        </p:nvPicPr>
+        <p:blipFill>
+          <a:blip r:embed="rId4">
+            <a:alphaModFix/>
+          </a:blip>
+          <a:stretch>
+            <a:fillRect/>
+          </a:stretch>
+        </p:blipFill>
+        <p:spPr>
+          <a:xfrm>
+            <a:off x="1951825" y="2529302"/>
+            <a:ext cx="1529600" cy="2476196"/>
+          </a:xfrm>
+          <a:prstGeom prst="rect">
+            <a:avLst/>
+          </a:prstGeom>
+          <a:noFill/>
+          <a:ln>
+            <a:noFill/>
+          </a:ln>
+        </p:spPr>
+      </p:pic>
     </p:spTree>
   </p:cSld>
   <p:clrMapOvr>
@@ -9930,7 +10014,7 @@
   <p:cSld>
     <p:spTree>
       <p:nvGrpSpPr>
-        <p:cNvPr id="145" name="Shape 145"/>
+        <p:cNvPr id="148" name="Shape 148"/>
         <p:cNvGrpSpPr/>
         <p:nvPr/>
       </p:nvGrpSpPr>
@@ -9944,7 +10028,7 @@
       </p:grpSpPr>
       <p:sp>
         <p:nvSpPr>
-          <p:cNvPr id="146" name="Shape 146"/>
+          <p:cNvPr id="149" name="Shape 149"/>
           <p:cNvSpPr txBox="1"/>
           <p:nvPr>
             <p:ph type="title"/>
@@ -9984,7 +10068,7 @@
       </p:sp>
       <p:sp>
         <p:nvSpPr>
-          <p:cNvPr id="147" name="Shape 147"/>
+          <p:cNvPr id="150" name="Shape 150"/>
           <p:cNvSpPr txBox="1"/>
           <p:nvPr>
             <p:ph idx="1" type="body"/>
@@ -10257,7 +10341,7 @@
   <p:cSld>
     <p:spTree>
       <p:nvGrpSpPr>
-        <p:cNvPr id="151" name="Shape 151"/>
+        <p:cNvPr id="154" name="Shape 154"/>
         <p:cNvGrpSpPr/>
         <p:nvPr/>
       </p:nvGrpSpPr>
@@ -10271,7 +10355,7 @@
       </p:grpSpPr>
       <p:sp>
         <p:nvSpPr>
-          <p:cNvPr id="152" name="Shape 152"/>
+          <p:cNvPr id="155" name="Shape 155"/>
           <p:cNvSpPr txBox="1"/>
           <p:nvPr>
             <p:ph type="title"/>
@@ -10311,7 +10395,7 @@
       </p:sp>
       <p:sp>
         <p:nvSpPr>
-          <p:cNvPr id="153" name="Shape 153"/>
+          <p:cNvPr id="156" name="Shape 156"/>
           <p:cNvSpPr txBox="1"/>
           <p:nvPr>
             <p:ph idx="1" type="body"/>
@@ -10511,7 +10595,7 @@
   <p:cSld>
     <p:spTree>
       <p:nvGrpSpPr>
-        <p:cNvPr id="157" name="Shape 157"/>
+        <p:cNvPr id="160" name="Shape 160"/>
         <p:cNvGrpSpPr/>
         <p:nvPr/>
       </p:nvGrpSpPr>
@@ -10525,7 +10609,7 @@
       </p:grpSpPr>
       <p:sp>
         <p:nvSpPr>
-          <p:cNvPr id="158" name="Shape 158"/>
+          <p:cNvPr id="161" name="Shape 161"/>
           <p:cNvSpPr txBox="1"/>
           <p:nvPr>
             <p:ph type="title"/>
@@ -10565,7 +10649,7 @@
       </p:sp>
       <p:sp>
         <p:nvSpPr>
-          <p:cNvPr id="159" name="Shape 159"/>
+          <p:cNvPr id="162" name="Shape 162"/>
           <p:cNvSpPr txBox="1"/>
           <p:nvPr>
             <p:ph idx="1" type="body"/>
@@ -10772,6 +10856,62 @@
           </a:p>
         </p:txBody>
       </p:sp>
+      <p:pic>
+        <p:nvPicPr>
+          <p:cNvPr id="163" name="Shape 163"/>
+          <p:cNvPicPr preferRelativeResize="0"/>
+          <p:nvPr/>
+        </p:nvPicPr>
+        <p:blipFill>
+          <a:blip r:embed="rId3">
+            <a:alphaModFix/>
+          </a:blip>
+          <a:stretch>
+            <a:fillRect/>
+          </a:stretch>
+        </p:blipFill>
+        <p:spPr>
+          <a:xfrm>
+            <a:off x="5782750" y="2985350"/>
+            <a:ext cx="1443650" cy="1849850"/>
+          </a:xfrm>
+          <a:prstGeom prst="rect">
+            <a:avLst/>
+          </a:prstGeom>
+          <a:noFill/>
+          <a:ln>
+            <a:noFill/>
+          </a:ln>
+        </p:spPr>
+      </p:pic>
+      <p:pic>
+        <p:nvPicPr>
+          <p:cNvPr id="164" name="Shape 164"/>
+          <p:cNvPicPr preferRelativeResize="0"/>
+          <p:nvPr/>
+        </p:nvPicPr>
+        <p:blipFill>
+          <a:blip r:embed="rId4">
+            <a:alphaModFix/>
+          </a:blip>
+          <a:stretch>
+            <a:fillRect/>
+          </a:stretch>
+        </p:blipFill>
+        <p:spPr>
+          <a:xfrm>
+            <a:off x="7501125" y="2985350"/>
+            <a:ext cx="1124000" cy="1810900"/>
+          </a:xfrm>
+          <a:prstGeom prst="rect">
+            <a:avLst/>
+          </a:prstGeom>
+          <a:noFill/>
+          <a:ln>
+            <a:noFill/>
+          </a:ln>
+        </p:spPr>
+      </p:pic>
     </p:spTree>
   </p:cSld>
   <p:clrMapOvr>
@@ -10785,7 +10925,7 @@
   <p:cSld>
     <p:spTree>
       <p:nvGrpSpPr>
-        <p:cNvPr id="163" name="Shape 163"/>
+        <p:cNvPr id="168" name="Shape 168"/>
         <p:cNvGrpSpPr/>
         <p:nvPr/>
       </p:nvGrpSpPr>
@@ -10799,7 +10939,7 @@
       </p:grpSpPr>
       <p:sp>
         <p:nvSpPr>
-          <p:cNvPr id="164" name="Shape 164"/>
+          <p:cNvPr id="169" name="Shape 169"/>
           <p:cNvSpPr txBox="1"/>
           <p:nvPr>
             <p:ph type="title"/>
@@ -10839,7 +10979,7 @@
       </p:sp>
       <p:sp>
         <p:nvSpPr>
-          <p:cNvPr id="165" name="Shape 165"/>
+          <p:cNvPr id="170" name="Shape 170"/>
           <p:cNvSpPr txBox="1"/>
           <p:nvPr>
             <p:ph idx="1" type="body"/>
@@ -11163,7 +11303,7 @@
   <p:cSld>
     <p:spTree>
       <p:nvGrpSpPr>
-        <p:cNvPr id="169" name="Shape 169"/>
+        <p:cNvPr id="174" name="Shape 174"/>
         <p:cNvGrpSpPr/>
         <p:nvPr/>
       </p:nvGrpSpPr>
@@ -11177,7 +11317,7 @@
       </p:grpSpPr>
       <p:sp>
         <p:nvSpPr>
-          <p:cNvPr id="170" name="Shape 170"/>
+          <p:cNvPr id="175" name="Shape 175"/>
           <p:cNvSpPr txBox="1"/>
           <p:nvPr>
             <p:ph type="title"/>
@@ -11217,7 +11357,7 @@
       </p:sp>
       <p:sp>
         <p:nvSpPr>
-          <p:cNvPr id="171" name="Shape 171"/>
+          <p:cNvPr id="176" name="Shape 176"/>
           <p:cNvSpPr txBox="1"/>
           <p:nvPr>
             <p:ph idx="1" type="body"/>

</xml_diff>